<commit_message>
Added use case to pp.
</commit_message>
<xml_diff>
--- a/Product Architecture.pptx
+++ b/Product Architecture.pptx
@@ -5285,22 +5285,191 @@
           </a:p>
         </p:txBody>
       </p:sp>
-      <p:sp>
-        <p:nvSpPr>
-          <p:cNvPr id="3" name="Content Placeholder 2"/>
-          <p:cNvSpPr>
-            <a:spLocks noGrp="1"/>
-          </p:cNvSpPr>
-          <p:nvPr>
-            <p:ph sz="quarter" idx="1"/>
-          </p:nvPr>
-        </p:nvSpPr>
-        <p:spPr/>
-        <p:txBody>
-          <a:bodyPr/>
-          <a:lstStyle/>
-          <a:p>
-            <a:endParaRPr lang="en-US"/>
+      <p:pic>
+        <p:nvPicPr>
+          <p:cNvPr id="4" name="Picture 2" descr="Image result for stick man"/>
+          <p:cNvPicPr>
+            <a:picLocks noChangeAspect="1" noChangeArrowheads="1"/>
+          </p:cNvPicPr>
+          <p:nvPr/>
+        </p:nvPicPr>
+        <p:blipFill>
+          <a:blip r:embed="rId2" cstate="print"/>
+          <a:srcRect/>
+          <a:stretch>
+            <a:fillRect/>
+          </a:stretch>
+        </p:blipFill>
+        <p:spPr bwMode="auto">
+          <a:xfrm>
+            <a:off x="228600" y="2971800"/>
+            <a:ext cx="1619250" cy="2286001"/>
+          </a:xfrm>
+          <a:prstGeom prst="rect">
+            <a:avLst/>
+          </a:prstGeom>
+          <a:noFill/>
+        </p:spPr>
+      </p:pic>
+      <p:cxnSp>
+        <p:nvCxnSpPr>
+          <p:cNvPr id="5" name="Straight Arrow Connector 4"/>
+          <p:cNvCxnSpPr/>
+          <p:nvPr/>
+        </p:nvCxnSpPr>
+        <p:spPr>
+          <a:xfrm>
+            <a:off x="1447800" y="4267200"/>
+            <a:ext cx="1219200" cy="1"/>
+          </a:xfrm>
+          <a:prstGeom prst="straightConnector1">
+            <a:avLst/>
+          </a:prstGeom>
+          <a:ln>
+            <a:tailEnd type="arrow"/>
+          </a:ln>
+        </p:spPr>
+        <p:style>
+          <a:lnRef idx="2">
+            <a:schemeClr val="dk1"/>
+          </a:lnRef>
+          <a:fillRef idx="0">
+            <a:schemeClr val="dk1"/>
+          </a:fillRef>
+          <a:effectRef idx="1">
+            <a:schemeClr val="dk1"/>
+          </a:effectRef>
+          <a:fontRef idx="minor">
+            <a:schemeClr val="tx1"/>
+          </a:fontRef>
+        </p:style>
+      </p:cxnSp>
+      <p:sp>
+        <p:nvSpPr>
+          <p:cNvPr id="6" name="Oval 5"/>
+          <p:cNvSpPr/>
+          <p:nvPr/>
+        </p:nvSpPr>
+        <p:spPr>
+          <a:xfrm>
+            <a:off x="2667000" y="3581400"/>
+            <a:ext cx="2286000" cy="1295400"/>
+          </a:xfrm>
+          <a:prstGeom prst="ellipse">
+            <a:avLst/>
+          </a:prstGeom>
+        </p:spPr>
+        <p:style>
+          <a:lnRef idx="1">
+            <a:schemeClr val="accent1"/>
+          </a:lnRef>
+          <a:fillRef idx="2">
+            <a:schemeClr val="accent1"/>
+          </a:fillRef>
+          <a:effectRef idx="1">
+            <a:schemeClr val="accent1"/>
+          </a:effectRef>
+          <a:fontRef idx="minor">
+            <a:schemeClr val="dk1"/>
+          </a:fontRef>
+        </p:style>
+        <p:txBody>
+          <a:bodyPr rtlCol="0" anchor="ctr"/>
+          <a:lstStyle/>
+          <a:p>
+            <a:pPr algn="ctr"/>
+            <a:r>
+              <a:rPr lang="en-US" dirty="0" smtClean="0"/>
+              <a:t>Search</a:t>
+            </a:r>
+          </a:p>
+          <a:p>
+            <a:pPr algn="ctr"/>
+            <a:r>
+              <a:rPr lang="en-US" dirty="0" smtClean="0"/>
+              <a:t>Recipe</a:t>
+            </a:r>
+          </a:p>
+        </p:txBody>
+      </p:sp>
+      <p:cxnSp>
+        <p:nvCxnSpPr>
+          <p:cNvPr id="7" name="Straight Arrow Connector 6"/>
+          <p:cNvCxnSpPr/>
+          <p:nvPr/>
+        </p:nvCxnSpPr>
+        <p:spPr>
+          <a:xfrm>
+            <a:off x="4953000" y="4267200"/>
+            <a:ext cx="1371600" cy="1"/>
+          </a:xfrm>
+          <a:prstGeom prst="straightConnector1">
+            <a:avLst/>
+          </a:prstGeom>
+          <a:ln>
+            <a:tailEnd type="arrow"/>
+          </a:ln>
+        </p:spPr>
+        <p:style>
+          <a:lnRef idx="2">
+            <a:schemeClr val="dk1"/>
+          </a:lnRef>
+          <a:fillRef idx="0">
+            <a:schemeClr val="dk1"/>
+          </a:fillRef>
+          <a:effectRef idx="1">
+            <a:schemeClr val="dk1"/>
+          </a:effectRef>
+          <a:fontRef idx="minor">
+            <a:schemeClr val="tx1"/>
+          </a:fontRef>
+        </p:style>
+      </p:cxnSp>
+      <p:sp>
+        <p:nvSpPr>
+          <p:cNvPr id="8" name="Oval 7"/>
+          <p:cNvSpPr/>
+          <p:nvPr/>
+        </p:nvSpPr>
+        <p:spPr>
+          <a:xfrm>
+            <a:off x="6324600" y="3657600"/>
+            <a:ext cx="2286000" cy="1295400"/>
+          </a:xfrm>
+          <a:prstGeom prst="ellipse">
+            <a:avLst/>
+          </a:prstGeom>
+        </p:spPr>
+        <p:style>
+          <a:lnRef idx="1">
+            <a:schemeClr val="accent1"/>
+          </a:lnRef>
+          <a:fillRef idx="2">
+            <a:schemeClr val="accent1"/>
+          </a:fillRef>
+          <a:effectRef idx="1">
+            <a:schemeClr val="accent1"/>
+          </a:effectRef>
+          <a:fontRef idx="minor">
+            <a:schemeClr val="dk1"/>
+          </a:fontRef>
+        </p:style>
+        <p:txBody>
+          <a:bodyPr rtlCol="0" anchor="ctr"/>
+          <a:lstStyle/>
+          <a:p>
+            <a:pPr algn="ctr"/>
+            <a:r>
+              <a:rPr lang="en-US" dirty="0" smtClean="0"/>
+              <a:t>View</a:t>
+            </a:r>
+          </a:p>
+          <a:p>
+            <a:pPr algn="ctr"/>
+            <a:r>
+              <a:rPr lang="en-US" dirty="0" smtClean="0"/>
+              <a:t>Recipe</a:t>
+            </a:r>
           </a:p>
         </p:txBody>
       </p:sp>
@@ -5357,25 +5526,562 @@
           </a:p>
         </p:txBody>
       </p:sp>
-      <p:sp>
-        <p:nvSpPr>
-          <p:cNvPr id="3" name="Content Placeholder 2"/>
-          <p:cNvSpPr>
-            <a:spLocks noGrp="1"/>
-          </p:cNvSpPr>
-          <p:nvPr>
-            <p:ph sz="quarter" idx="1"/>
-          </p:nvPr>
-        </p:nvSpPr>
-        <p:spPr/>
-        <p:txBody>
-          <a:bodyPr/>
-          <a:lstStyle/>
-          <a:p>
-            <a:endParaRPr lang="en-US"/>
-          </a:p>
-        </p:txBody>
-      </p:sp>
+      <p:grpSp>
+        <p:nvGrpSpPr>
+          <p:cNvPr id="4" name="Group 3"/>
+          <p:cNvGrpSpPr/>
+          <p:nvPr/>
+        </p:nvGrpSpPr>
+        <p:grpSpPr>
+          <a:xfrm>
+            <a:off x="1524000" y="1998974"/>
+            <a:ext cx="6324600" cy="4323514"/>
+            <a:chOff x="304800" y="609600"/>
+            <a:chExt cx="8248650" cy="5638800"/>
+          </a:xfrm>
+        </p:grpSpPr>
+        <p:pic>
+          <p:nvPicPr>
+            <p:cNvPr id="5" name="Picture 2" descr="Image result for stick man"/>
+            <p:cNvPicPr>
+              <a:picLocks noChangeAspect="1" noChangeArrowheads="1"/>
+            </p:cNvPicPr>
+            <p:nvPr/>
+          </p:nvPicPr>
+          <p:blipFill>
+            <a:blip r:embed="rId2" cstate="print"/>
+            <a:srcRect/>
+            <a:stretch>
+              <a:fillRect/>
+            </a:stretch>
+          </p:blipFill>
+          <p:spPr bwMode="auto">
+            <a:xfrm>
+              <a:off x="304800" y="2438400"/>
+              <a:ext cx="1619250" cy="2286001"/>
+            </a:xfrm>
+            <a:prstGeom prst="rect">
+              <a:avLst/>
+            </a:prstGeom>
+            <a:noFill/>
+          </p:spPr>
+        </p:pic>
+        <p:cxnSp>
+          <p:nvCxnSpPr>
+            <p:cNvPr id="6" name="Straight Arrow Connector 5"/>
+            <p:cNvCxnSpPr/>
+            <p:nvPr/>
+          </p:nvCxnSpPr>
+          <p:spPr>
+            <a:xfrm flipV="1">
+              <a:off x="1676400" y="1219200"/>
+              <a:ext cx="1752600" cy="2057400"/>
+            </a:xfrm>
+            <a:prstGeom prst="straightConnector1">
+              <a:avLst/>
+            </a:prstGeom>
+            <a:ln>
+              <a:tailEnd type="arrow"/>
+            </a:ln>
+          </p:spPr>
+          <p:style>
+            <a:lnRef idx="2">
+              <a:schemeClr val="dk1"/>
+            </a:lnRef>
+            <a:fillRef idx="0">
+              <a:schemeClr val="dk1"/>
+            </a:fillRef>
+            <a:effectRef idx="1">
+              <a:schemeClr val="dk1"/>
+            </a:effectRef>
+            <a:fontRef idx="minor">
+              <a:schemeClr val="tx1"/>
+            </a:fontRef>
+          </p:style>
+        </p:cxnSp>
+        <p:sp>
+          <p:nvSpPr>
+            <p:cNvPr id="7" name="Oval 6"/>
+            <p:cNvSpPr/>
+            <p:nvPr/>
+          </p:nvSpPr>
+          <p:spPr>
+            <a:xfrm>
+              <a:off x="3429000" y="609600"/>
+              <a:ext cx="2286000" cy="1295400"/>
+            </a:xfrm>
+            <a:prstGeom prst="ellipse">
+              <a:avLst/>
+            </a:prstGeom>
+          </p:spPr>
+          <p:style>
+            <a:lnRef idx="1">
+              <a:schemeClr val="accent1"/>
+            </a:lnRef>
+            <a:fillRef idx="2">
+              <a:schemeClr val="accent1"/>
+            </a:fillRef>
+            <a:effectRef idx="1">
+              <a:schemeClr val="accent1"/>
+            </a:effectRef>
+            <a:fontRef idx="minor">
+              <a:schemeClr val="dk1"/>
+            </a:fontRef>
+          </p:style>
+          <p:txBody>
+            <a:bodyPr rtlCol="0" anchor="ctr"/>
+            <a:lstStyle/>
+            <a:p>
+              <a:pPr algn="ctr"/>
+              <a:r>
+                <a:rPr lang="en-US" dirty="0" smtClean="0"/>
+                <a:t>Add</a:t>
+              </a:r>
+            </a:p>
+            <a:p>
+              <a:pPr algn="ctr"/>
+              <a:r>
+                <a:rPr lang="en-US" dirty="0" smtClean="0"/>
+                <a:t>Recipe</a:t>
+              </a:r>
+            </a:p>
+          </p:txBody>
+        </p:sp>
+        <p:sp>
+          <p:nvSpPr>
+            <p:cNvPr id="8" name="Oval 7"/>
+            <p:cNvSpPr/>
+            <p:nvPr/>
+          </p:nvSpPr>
+          <p:spPr>
+            <a:xfrm>
+              <a:off x="3429000" y="3505200"/>
+              <a:ext cx="2286000" cy="1295400"/>
+            </a:xfrm>
+            <a:prstGeom prst="ellipse">
+              <a:avLst/>
+            </a:prstGeom>
+          </p:spPr>
+          <p:style>
+            <a:lnRef idx="1">
+              <a:schemeClr val="accent1"/>
+            </a:lnRef>
+            <a:fillRef idx="2">
+              <a:schemeClr val="accent1"/>
+            </a:fillRef>
+            <a:effectRef idx="1">
+              <a:schemeClr val="accent1"/>
+            </a:effectRef>
+            <a:fontRef idx="minor">
+              <a:schemeClr val="dk1"/>
+            </a:fontRef>
+          </p:style>
+          <p:txBody>
+            <a:bodyPr rtlCol="0" anchor="ctr"/>
+            <a:lstStyle/>
+            <a:p>
+              <a:pPr algn="ctr"/>
+              <a:r>
+                <a:rPr lang="en-US" dirty="0" smtClean="0"/>
+                <a:t>View</a:t>
+              </a:r>
+            </a:p>
+            <a:p>
+              <a:pPr algn="ctr"/>
+              <a:r>
+                <a:rPr lang="en-US" dirty="0" smtClean="0"/>
+                <a:t>Recipe</a:t>
+              </a:r>
+            </a:p>
+          </p:txBody>
+        </p:sp>
+        <p:sp>
+          <p:nvSpPr>
+            <p:cNvPr id="9" name="Oval 8"/>
+            <p:cNvSpPr/>
+            <p:nvPr/>
+          </p:nvSpPr>
+          <p:spPr>
+            <a:xfrm>
+              <a:off x="3429000" y="4953000"/>
+              <a:ext cx="2286000" cy="1295400"/>
+            </a:xfrm>
+            <a:prstGeom prst="ellipse">
+              <a:avLst/>
+            </a:prstGeom>
+          </p:spPr>
+          <p:style>
+            <a:lnRef idx="1">
+              <a:schemeClr val="accent1"/>
+            </a:lnRef>
+            <a:fillRef idx="2">
+              <a:schemeClr val="accent1"/>
+            </a:fillRef>
+            <a:effectRef idx="1">
+              <a:schemeClr val="accent1"/>
+            </a:effectRef>
+            <a:fontRef idx="minor">
+              <a:schemeClr val="dk1"/>
+            </a:fontRef>
+          </p:style>
+          <p:txBody>
+            <a:bodyPr rtlCol="0" anchor="ctr"/>
+            <a:lstStyle/>
+            <a:p>
+              <a:pPr algn="ctr"/>
+              <a:r>
+                <a:rPr lang="en-US" dirty="0" smtClean="0"/>
+                <a:t>Delete</a:t>
+              </a:r>
+            </a:p>
+            <a:p>
+              <a:pPr algn="ctr"/>
+              <a:r>
+                <a:rPr lang="en-US" dirty="0" smtClean="0"/>
+                <a:t>Recipe</a:t>
+              </a:r>
+            </a:p>
+          </p:txBody>
+        </p:sp>
+        <p:sp>
+          <p:nvSpPr>
+            <p:cNvPr id="10" name="Oval 9"/>
+            <p:cNvSpPr/>
+            <p:nvPr/>
+          </p:nvSpPr>
+          <p:spPr>
+            <a:xfrm>
+              <a:off x="3429000" y="2057400"/>
+              <a:ext cx="2286000" cy="1295400"/>
+            </a:xfrm>
+            <a:prstGeom prst="ellipse">
+              <a:avLst/>
+            </a:prstGeom>
+          </p:spPr>
+          <p:style>
+            <a:lnRef idx="1">
+              <a:schemeClr val="accent1"/>
+            </a:lnRef>
+            <a:fillRef idx="2">
+              <a:schemeClr val="accent1"/>
+            </a:fillRef>
+            <a:effectRef idx="1">
+              <a:schemeClr val="accent1"/>
+            </a:effectRef>
+            <a:fontRef idx="minor">
+              <a:schemeClr val="dk1"/>
+            </a:fontRef>
+          </p:style>
+          <p:txBody>
+            <a:bodyPr rtlCol="0" anchor="ctr"/>
+            <a:lstStyle/>
+            <a:p>
+              <a:pPr algn="ctr"/>
+              <a:r>
+                <a:rPr lang="en-US" dirty="0" smtClean="0"/>
+                <a:t>Edit</a:t>
+              </a:r>
+            </a:p>
+            <a:p>
+              <a:pPr algn="ctr"/>
+              <a:r>
+                <a:rPr lang="en-US" dirty="0" smtClean="0"/>
+                <a:t>Recipe</a:t>
+              </a:r>
+            </a:p>
+          </p:txBody>
+        </p:sp>
+        <p:cxnSp>
+          <p:nvCxnSpPr>
+            <p:cNvPr id="11" name="Straight Arrow Connector 10"/>
+            <p:cNvCxnSpPr/>
+            <p:nvPr/>
+          </p:nvCxnSpPr>
+          <p:spPr>
+            <a:xfrm flipV="1">
+              <a:off x="1676400" y="2743200"/>
+              <a:ext cx="1752600" cy="838200"/>
+            </a:xfrm>
+            <a:prstGeom prst="straightConnector1">
+              <a:avLst/>
+            </a:prstGeom>
+            <a:ln>
+              <a:tailEnd type="arrow"/>
+            </a:ln>
+          </p:spPr>
+          <p:style>
+            <a:lnRef idx="2">
+              <a:schemeClr val="dk1"/>
+            </a:lnRef>
+            <a:fillRef idx="0">
+              <a:schemeClr val="dk1"/>
+            </a:fillRef>
+            <a:effectRef idx="1">
+              <a:schemeClr val="dk1"/>
+            </a:effectRef>
+            <a:fontRef idx="minor">
+              <a:schemeClr val="tx1"/>
+            </a:fontRef>
+          </p:style>
+        </p:cxnSp>
+        <p:cxnSp>
+          <p:nvCxnSpPr>
+            <p:cNvPr id="12" name="Straight Arrow Connector 11"/>
+            <p:cNvCxnSpPr/>
+            <p:nvPr/>
+          </p:nvCxnSpPr>
+          <p:spPr>
+            <a:xfrm>
+              <a:off x="1676400" y="3886200"/>
+              <a:ext cx="1752600" cy="228600"/>
+            </a:xfrm>
+            <a:prstGeom prst="straightConnector1">
+              <a:avLst/>
+            </a:prstGeom>
+            <a:ln>
+              <a:tailEnd type="arrow"/>
+            </a:ln>
+          </p:spPr>
+          <p:style>
+            <a:lnRef idx="2">
+              <a:schemeClr val="dk1"/>
+            </a:lnRef>
+            <a:fillRef idx="0">
+              <a:schemeClr val="dk1"/>
+            </a:fillRef>
+            <a:effectRef idx="1">
+              <a:schemeClr val="dk1"/>
+            </a:effectRef>
+            <a:fontRef idx="minor">
+              <a:schemeClr val="tx1"/>
+            </a:fontRef>
+          </p:style>
+        </p:cxnSp>
+        <p:cxnSp>
+          <p:nvCxnSpPr>
+            <p:cNvPr id="13" name="Straight Arrow Connector 12"/>
+            <p:cNvCxnSpPr/>
+            <p:nvPr/>
+          </p:nvCxnSpPr>
+          <p:spPr>
+            <a:xfrm>
+              <a:off x="1676400" y="4191000"/>
+              <a:ext cx="1752600" cy="1447800"/>
+            </a:xfrm>
+            <a:prstGeom prst="straightConnector1">
+              <a:avLst/>
+            </a:prstGeom>
+            <a:ln>
+              <a:tailEnd type="arrow"/>
+            </a:ln>
+          </p:spPr>
+          <p:style>
+            <a:lnRef idx="2">
+              <a:schemeClr val="dk1"/>
+            </a:lnRef>
+            <a:fillRef idx="0">
+              <a:schemeClr val="dk1"/>
+            </a:fillRef>
+            <a:effectRef idx="1">
+              <a:schemeClr val="dk1"/>
+            </a:effectRef>
+            <a:fontRef idx="minor">
+              <a:schemeClr val="tx1"/>
+            </a:fontRef>
+          </p:style>
+        </p:cxnSp>
+        <p:sp>
+          <p:nvSpPr>
+            <p:cNvPr id="14" name="TextBox 13"/>
+            <p:cNvSpPr txBox="1"/>
+            <p:nvPr/>
+          </p:nvSpPr>
+          <p:spPr>
+            <a:xfrm>
+              <a:off x="762000" y="4648200"/>
+              <a:ext cx="617477" cy="369332"/>
+            </a:xfrm>
+            <a:prstGeom prst="rect">
+              <a:avLst/>
+            </a:prstGeom>
+            <a:noFill/>
+          </p:spPr>
+          <p:txBody>
+            <a:bodyPr wrap="none" rtlCol="0">
+              <a:spAutoFit/>
+            </a:bodyPr>
+            <a:lstStyle/>
+            <a:p>
+              <a:r>
+                <a:rPr lang="en-US" dirty="0" smtClean="0"/>
+                <a:t>User</a:t>
+              </a:r>
+            </a:p>
+          </p:txBody>
+        </p:sp>
+        <p:pic>
+          <p:nvPicPr>
+            <p:cNvPr id="15" name="Picture 2" descr="Image result for stick man"/>
+            <p:cNvPicPr>
+              <a:picLocks noChangeAspect="1" noChangeArrowheads="1"/>
+            </p:cNvPicPr>
+            <p:nvPr/>
+          </p:nvPicPr>
+          <p:blipFill>
+            <a:blip r:embed="rId2" cstate="print"/>
+            <a:srcRect/>
+            <a:stretch>
+              <a:fillRect/>
+            </a:stretch>
+          </p:blipFill>
+          <p:spPr bwMode="auto">
+            <a:xfrm>
+              <a:off x="6934200" y="2209800"/>
+              <a:ext cx="1619250" cy="2286001"/>
+            </a:xfrm>
+            <a:prstGeom prst="rect">
+              <a:avLst/>
+            </a:prstGeom>
+            <a:noFill/>
+          </p:spPr>
+        </p:pic>
+        <p:cxnSp>
+          <p:nvCxnSpPr>
+            <p:cNvPr id="16" name="Straight Arrow Connector 15"/>
+            <p:cNvCxnSpPr/>
+            <p:nvPr/>
+          </p:nvCxnSpPr>
+          <p:spPr>
+            <a:xfrm>
+              <a:off x="5715000" y="1219200"/>
+              <a:ext cx="1295400" cy="1600200"/>
+            </a:xfrm>
+            <a:prstGeom prst="straightConnector1">
+              <a:avLst/>
+            </a:prstGeom>
+            <a:ln>
+              <a:tailEnd type="arrow"/>
+            </a:ln>
+          </p:spPr>
+          <p:style>
+            <a:lnRef idx="2">
+              <a:schemeClr val="dk1"/>
+            </a:lnRef>
+            <a:fillRef idx="0">
+              <a:schemeClr val="dk1"/>
+            </a:fillRef>
+            <a:effectRef idx="1">
+              <a:schemeClr val="dk1"/>
+            </a:effectRef>
+            <a:fontRef idx="minor">
+              <a:schemeClr val="tx1"/>
+            </a:fontRef>
+          </p:style>
+        </p:cxnSp>
+        <p:cxnSp>
+          <p:nvCxnSpPr>
+            <p:cNvPr id="17" name="Straight Arrow Connector 16"/>
+            <p:cNvCxnSpPr/>
+            <p:nvPr/>
+          </p:nvCxnSpPr>
+          <p:spPr>
+            <a:xfrm>
+              <a:off x="5715000" y="2743200"/>
+              <a:ext cx="1219200" cy="762000"/>
+            </a:xfrm>
+            <a:prstGeom prst="straightConnector1">
+              <a:avLst/>
+            </a:prstGeom>
+            <a:ln>
+              <a:tailEnd type="arrow"/>
+            </a:ln>
+          </p:spPr>
+          <p:style>
+            <a:lnRef idx="2">
+              <a:schemeClr val="dk1"/>
+            </a:lnRef>
+            <a:fillRef idx="0">
+              <a:schemeClr val="dk1"/>
+            </a:fillRef>
+            <a:effectRef idx="1">
+              <a:schemeClr val="dk1"/>
+            </a:effectRef>
+            <a:fontRef idx="minor">
+              <a:schemeClr val="tx1"/>
+            </a:fontRef>
+          </p:style>
+        </p:cxnSp>
+        <p:cxnSp>
+          <p:nvCxnSpPr>
+            <p:cNvPr id="18" name="Straight Arrow Connector 17"/>
+            <p:cNvCxnSpPr/>
+            <p:nvPr/>
+          </p:nvCxnSpPr>
+          <p:spPr>
+            <a:xfrm flipV="1">
+              <a:off x="5715000" y="4191000"/>
+              <a:ext cx="1295400" cy="1447800"/>
+            </a:xfrm>
+            <a:prstGeom prst="straightConnector1">
+              <a:avLst/>
+            </a:prstGeom>
+            <a:ln>
+              <a:tailEnd type="arrow"/>
+            </a:ln>
+          </p:spPr>
+          <p:style>
+            <a:lnRef idx="2">
+              <a:schemeClr val="dk1"/>
+            </a:lnRef>
+            <a:fillRef idx="0">
+              <a:schemeClr val="dk1"/>
+            </a:fillRef>
+            <a:effectRef idx="1">
+              <a:schemeClr val="dk1"/>
+            </a:effectRef>
+            <a:fontRef idx="minor">
+              <a:schemeClr val="tx1"/>
+            </a:fontRef>
+          </p:style>
+        </p:cxnSp>
+        <p:sp>
+          <p:nvSpPr>
+            <p:cNvPr id="19" name="TextBox 18"/>
+            <p:cNvSpPr txBox="1"/>
+            <p:nvPr/>
+          </p:nvSpPr>
+          <p:spPr>
+            <a:xfrm>
+              <a:off x="7239000" y="4419600"/>
+              <a:ext cx="1114279" cy="646331"/>
+            </a:xfrm>
+            <a:prstGeom prst="rect">
+              <a:avLst/>
+            </a:prstGeom>
+            <a:noFill/>
+          </p:spPr>
+          <p:txBody>
+            <a:bodyPr wrap="none" rtlCol="0">
+              <a:spAutoFit/>
+            </a:bodyPr>
+            <a:lstStyle/>
+            <a:p>
+              <a:pPr algn="ctr"/>
+              <a:r>
+                <a:rPr lang="en-US" dirty="0" smtClean="0"/>
+                <a:t>Recipe </a:t>
+              </a:r>
+            </a:p>
+            <a:p>
+              <a:pPr algn="ctr"/>
+              <a:r>
+                <a:rPr lang="en-US" dirty="0" smtClean="0"/>
+                <a:t>Data Base</a:t>
+              </a:r>
+            </a:p>
+          </p:txBody>
+        </p:sp>
+      </p:grpSp>
     </p:spTree>
     <p:extLst>
       <p:ext uri="{BB962C8B-B14F-4D97-AF65-F5344CB8AC3E}">

</xml_diff>

<commit_message>
Worked on product arch. doc and fixed phrasing in PP.
</commit_message>
<xml_diff>
--- a/Product Architecture.pptx
+++ b/Product Architecture.pptx
@@ -408,7 +408,7 @@
           <a:p>
             <a:fld id="{130FE80D-5E74-40FB-A2BF-534CF180AA25}" type="datetimeFigureOut">
               <a:rPr lang="en-US" smtClean="0"/>
-              <a:t>4/2/2017</a:t>
+              <a:t>4/9/2017</a:t>
             </a:fld>
             <a:endParaRPr lang="en-US"/>
           </a:p>
@@ -599,7 +599,7 @@
           <a:p>
             <a:fld id="{130FE80D-5E74-40FB-A2BF-534CF180AA25}" type="datetimeFigureOut">
               <a:rPr lang="en-US" smtClean="0"/>
-              <a:t>4/2/2017</a:t>
+              <a:t>4/9/2017</a:t>
             </a:fld>
             <a:endParaRPr lang="en-US"/>
           </a:p>
@@ -784,7 +784,7 @@
           <a:p>
             <a:fld id="{130FE80D-5E74-40FB-A2BF-534CF180AA25}" type="datetimeFigureOut">
               <a:rPr lang="en-US" smtClean="0"/>
-              <a:t>4/2/2017</a:t>
+              <a:t>4/9/2017</a:t>
             </a:fld>
             <a:endParaRPr lang="en-US"/>
           </a:p>
@@ -1047,7 +1047,7 @@
           <a:p>
             <a:fld id="{130FE80D-5E74-40FB-A2BF-534CF180AA25}" type="datetimeFigureOut">
               <a:rPr lang="en-US" smtClean="0"/>
-              <a:t>4/2/2017</a:t>
+              <a:t>4/9/2017</a:t>
             </a:fld>
             <a:endParaRPr lang="en-US"/>
           </a:p>
@@ -1463,7 +1463,7 @@
           <a:p>
             <a:fld id="{130FE80D-5E74-40FB-A2BF-534CF180AA25}" type="datetimeFigureOut">
               <a:rPr lang="en-US" smtClean="0"/>
-              <a:t>4/2/2017</a:t>
+              <a:t>4/9/2017</a:t>
             </a:fld>
             <a:endParaRPr lang="en-US"/>
           </a:p>
@@ -1705,7 +1705,7 @@
           <a:p>
             <a:fld id="{130FE80D-5E74-40FB-A2BF-534CF180AA25}" type="datetimeFigureOut">
               <a:rPr lang="en-US" smtClean="0"/>
-              <a:t>4/2/2017</a:t>
+              <a:t>4/9/2017</a:t>
             </a:fld>
             <a:endParaRPr lang="en-US"/>
           </a:p>
@@ -1941,7 +1941,7 @@
           <a:p>
             <a:fld id="{130FE80D-5E74-40FB-A2BF-534CF180AA25}" type="datetimeFigureOut">
               <a:rPr lang="en-US" smtClean="0"/>
-              <a:t>4/2/2017</a:t>
+              <a:t>4/9/2017</a:t>
             </a:fld>
             <a:endParaRPr lang="en-US"/>
           </a:p>
@@ -2136,7 +2136,7 @@
           <a:p>
             <a:fld id="{130FE80D-5E74-40FB-A2BF-534CF180AA25}" type="datetimeFigureOut">
               <a:rPr lang="en-US" smtClean="0"/>
-              <a:t>4/2/2017</a:t>
+              <a:t>4/9/2017</a:t>
             </a:fld>
             <a:endParaRPr lang="en-US"/>
           </a:p>
@@ -2234,7 +2234,7 @@
           <a:p>
             <a:fld id="{130FE80D-5E74-40FB-A2BF-534CF180AA25}" type="datetimeFigureOut">
               <a:rPr lang="en-US" smtClean="0"/>
-              <a:t>4/2/2017</a:t>
+              <a:t>4/9/2017</a:t>
             </a:fld>
             <a:endParaRPr lang="en-US"/>
           </a:p>
@@ -2370,7 +2370,7 @@
           <a:p>
             <a:fld id="{130FE80D-5E74-40FB-A2BF-534CF180AA25}" type="datetimeFigureOut">
               <a:rPr lang="en-US" smtClean="0"/>
-              <a:t>4/2/2017</a:t>
+              <a:t>4/9/2017</a:t>
             </a:fld>
             <a:endParaRPr lang="en-US"/>
           </a:p>
@@ -2888,7 +2888,7 @@
           <a:p>
             <a:fld id="{130FE80D-5E74-40FB-A2BF-534CF180AA25}" type="datetimeFigureOut">
               <a:rPr lang="en-US" smtClean="0"/>
-              <a:t>4/2/2017</a:t>
+              <a:t>4/9/2017</a:t>
             </a:fld>
             <a:endParaRPr lang="en-US"/>
           </a:p>
@@ -3149,7 +3149,7 @@
           <a:p>
             <a:fld id="{130FE80D-5E74-40FB-A2BF-534CF180AA25}" type="datetimeFigureOut">
               <a:rPr lang="en-US" smtClean="0"/>
-              <a:t>4/2/2017</a:t>
+              <a:t>4/9/2017</a:t>
             </a:fld>
             <a:endParaRPr lang="en-US"/>
           </a:p>
@@ -3837,6 +3837,13 @@
   <p:clrMapOvr>
     <a:masterClrMapping/>
   </p:clrMapOvr>
+  <p:timing>
+    <p:tnLst>
+      <p:par>
+        <p:cTn id="1" dur="indefinite" restart="never" nodeType="tmRoot"/>
+      </p:par>
+    </p:tnLst>
+  </p:timing>
 </p:sld>
 </file>
 
@@ -3921,6 +3928,13 @@
   <p:clrMapOvr>
     <a:masterClrMapping/>
   </p:clrMapOvr>
+  <p:timing>
+    <p:tnLst>
+      <p:par>
+        <p:cTn id="1" dur="indefinite" restart="never" nodeType="tmRoot"/>
+      </p:par>
+    </p:tnLst>
+  </p:timing>
 </p:sld>
 </file>
 
@@ -3964,222 +3978,237 @@
           </a:p>
         </p:txBody>
       </p:sp>
-      <p:sp>
-        <p:nvSpPr>
-          <p:cNvPr id="4" name="Rectangle 3"/>
-          <p:cNvSpPr/>
+      <p:grpSp>
+        <p:nvGrpSpPr>
+          <p:cNvPr id="3" name="Group 2"/>
+          <p:cNvGrpSpPr/>
           <p:nvPr/>
-        </p:nvSpPr>
-        <p:spPr>
-          <a:xfrm>
-            <a:off x="457200" y="2209800"/>
-            <a:ext cx="8153400" cy="1143000"/>
-          </a:xfrm>
-          <a:prstGeom prst="rect">
-            <a:avLst/>
-          </a:prstGeom>
-          <a:solidFill>
-            <a:srgbClr val="775F55"/>
-          </a:solidFill>
-          <a:ln w="25400">
+        </p:nvGrpSpPr>
+        <p:grpSpPr>
+          <a:xfrm>
+            <a:off x="455776" y="2209800"/>
+            <a:ext cx="8188294" cy="3886200"/>
+            <a:chOff x="455776" y="2209800"/>
+            <a:chExt cx="8188294" cy="3886200"/>
+          </a:xfrm>
+        </p:grpSpPr>
+        <p:sp>
+          <p:nvSpPr>
+            <p:cNvPr id="4" name="Rectangle 3"/>
+            <p:cNvSpPr/>
+            <p:nvPr/>
+          </p:nvSpPr>
+          <p:spPr>
+            <a:xfrm>
+              <a:off x="457200" y="2209800"/>
+              <a:ext cx="8153400" cy="1143000"/>
+            </a:xfrm>
+            <a:prstGeom prst="rect">
+              <a:avLst/>
+            </a:prstGeom>
             <a:solidFill>
-              <a:schemeClr val="bg2">
-                <a:lumMod val="10000"/>
+              <a:srgbClr val="775F55"/>
+            </a:solidFill>
+            <a:ln w="25400">
+              <a:solidFill>
+                <a:schemeClr val="bg2">
+                  <a:lumMod val="10000"/>
+                </a:schemeClr>
+              </a:solidFill>
+            </a:ln>
+          </p:spPr>
+          <p:style>
+            <a:lnRef idx="2">
+              <a:schemeClr val="accent1">
+                <a:shade val="50000"/>
               </a:schemeClr>
+            </a:lnRef>
+            <a:fillRef idx="1">
+              <a:schemeClr val="accent1"/>
+            </a:fillRef>
+            <a:effectRef idx="0">
+              <a:schemeClr val="accent1"/>
+            </a:effectRef>
+            <a:fontRef idx="minor">
+              <a:schemeClr val="lt1"/>
+            </a:fontRef>
+          </p:style>
+          <p:txBody>
+            <a:bodyPr rtlCol="0" anchor="ctr"/>
+            <a:lstStyle/>
+            <a:p>
+              <a:pPr algn="ctr"/>
+              <a:r>
+                <a:rPr lang="en-US" sz="3200" dirty="0" smtClean="0"/>
+                <a:t>Android Material Design UI</a:t>
+              </a:r>
+              <a:endParaRPr lang="en-US" sz="3200" dirty="0"/>
+            </a:p>
+          </p:txBody>
+        </p:sp>
+        <p:sp>
+          <p:nvSpPr>
+            <p:cNvPr id="5" name="Rectangle 4"/>
+            <p:cNvSpPr/>
+            <p:nvPr/>
+          </p:nvSpPr>
+          <p:spPr>
+            <a:xfrm>
+              <a:off x="457200" y="3581400"/>
+              <a:ext cx="8153400" cy="1143000"/>
+            </a:xfrm>
+            <a:prstGeom prst="rect">
+              <a:avLst/>
+            </a:prstGeom>
+            <a:solidFill>
+              <a:srgbClr val="775F55"/>
             </a:solidFill>
-          </a:ln>
-        </p:spPr>
-        <p:style>
-          <a:lnRef idx="2">
-            <a:schemeClr val="accent1">
-              <a:shade val="50000"/>
-            </a:schemeClr>
-          </a:lnRef>
-          <a:fillRef idx="1">
-            <a:schemeClr val="accent1"/>
-          </a:fillRef>
-          <a:effectRef idx="0">
-            <a:schemeClr val="accent1"/>
-          </a:effectRef>
-          <a:fontRef idx="minor">
-            <a:schemeClr val="lt1"/>
-          </a:fontRef>
-        </p:style>
-        <p:txBody>
-          <a:bodyPr rtlCol="0" anchor="ctr"/>
-          <a:lstStyle/>
-          <a:p>
-            <a:pPr algn="ctr"/>
-            <a:r>
-              <a:rPr lang="en-US" sz="3200" dirty="0" smtClean="0"/>
-              <a:t>Android Material Design UI</a:t>
-            </a:r>
-            <a:endParaRPr lang="en-US" sz="3200" dirty="0"/>
-          </a:p>
-        </p:txBody>
-      </p:sp>
-      <p:sp>
-        <p:nvSpPr>
-          <p:cNvPr id="5" name="Rectangle 4"/>
-          <p:cNvSpPr/>
-          <p:nvPr/>
-        </p:nvSpPr>
-        <p:spPr>
-          <a:xfrm>
-            <a:off x="457200" y="3581400"/>
-            <a:ext cx="8153400" cy="1143000"/>
-          </a:xfrm>
-          <a:prstGeom prst="rect">
-            <a:avLst/>
-          </a:prstGeom>
-          <a:solidFill>
-            <a:srgbClr val="775F55"/>
-          </a:solidFill>
-          <a:ln w="25400">
+            <a:ln w="25400">
+              <a:solidFill>
+                <a:schemeClr val="bg2">
+                  <a:lumMod val="10000"/>
+                </a:schemeClr>
+              </a:solidFill>
+            </a:ln>
+          </p:spPr>
+          <p:style>
+            <a:lnRef idx="2">
+              <a:schemeClr val="accent1">
+                <a:shade val="50000"/>
+              </a:schemeClr>
+            </a:lnRef>
+            <a:fillRef idx="1">
+              <a:schemeClr val="accent1"/>
+            </a:fillRef>
+            <a:effectRef idx="0">
+              <a:schemeClr val="accent1"/>
+            </a:effectRef>
+            <a:fontRef idx="minor">
+              <a:schemeClr val="lt1"/>
+            </a:fontRef>
+          </p:style>
+          <p:txBody>
+            <a:bodyPr rtlCol="0" anchor="ctr"/>
+            <a:lstStyle/>
+            <a:p>
+              <a:pPr algn="ctr"/>
+              <a:r>
+                <a:rPr lang="en-US" sz="3200" dirty="0" smtClean="0"/>
+                <a:t>Application Code</a:t>
+              </a:r>
+              <a:endParaRPr lang="en-US" sz="3200" dirty="0"/>
+            </a:p>
+          </p:txBody>
+        </p:sp>
+        <p:sp>
+          <p:nvSpPr>
+            <p:cNvPr id="6" name="Rectangle 5"/>
+            <p:cNvSpPr/>
+            <p:nvPr/>
+          </p:nvSpPr>
+          <p:spPr>
+            <a:xfrm>
+              <a:off x="455776" y="4953000"/>
+              <a:ext cx="3811424" cy="1143000"/>
+            </a:xfrm>
+            <a:prstGeom prst="rect">
+              <a:avLst/>
+            </a:prstGeom>
             <a:solidFill>
-              <a:schemeClr val="bg2">
-                <a:lumMod val="10000"/>
+              <a:srgbClr val="775F55"/>
+            </a:solidFill>
+            <a:ln w="25400">
+              <a:solidFill>
+                <a:schemeClr val="bg2">
+                  <a:lumMod val="10000"/>
+                </a:schemeClr>
+              </a:solidFill>
+            </a:ln>
+          </p:spPr>
+          <p:style>
+            <a:lnRef idx="2">
+              <a:schemeClr val="accent1">
+                <a:shade val="50000"/>
               </a:schemeClr>
+            </a:lnRef>
+            <a:fillRef idx="1">
+              <a:schemeClr val="accent1"/>
+            </a:fillRef>
+            <a:effectRef idx="0">
+              <a:schemeClr val="accent1"/>
+            </a:effectRef>
+            <a:fontRef idx="minor">
+              <a:schemeClr val="lt1"/>
+            </a:fontRef>
+          </p:style>
+          <p:txBody>
+            <a:bodyPr rtlCol="0" anchor="ctr"/>
+            <a:lstStyle/>
+            <a:p>
+              <a:pPr algn="ctr"/>
+              <a:r>
+                <a:rPr lang="en-US" sz="3200" dirty="0" smtClean="0"/>
+                <a:t>Android OS</a:t>
+              </a:r>
+              <a:endParaRPr lang="en-US" sz="3200" dirty="0"/>
+            </a:p>
+          </p:txBody>
+        </p:sp>
+        <p:sp>
+          <p:nvSpPr>
+            <p:cNvPr id="7" name="Rectangle 6"/>
+            <p:cNvSpPr/>
+            <p:nvPr/>
+          </p:nvSpPr>
+          <p:spPr>
+            <a:xfrm>
+              <a:off x="4724399" y="4953000"/>
+              <a:ext cx="3919671" cy="1143000"/>
+            </a:xfrm>
+            <a:prstGeom prst="rect">
+              <a:avLst/>
+            </a:prstGeom>
+            <a:solidFill>
+              <a:srgbClr val="775F55"/>
             </a:solidFill>
-          </a:ln>
-        </p:spPr>
-        <p:style>
-          <a:lnRef idx="2">
-            <a:schemeClr val="accent1">
-              <a:shade val="50000"/>
-            </a:schemeClr>
-          </a:lnRef>
-          <a:fillRef idx="1">
-            <a:schemeClr val="accent1"/>
-          </a:fillRef>
-          <a:effectRef idx="0">
-            <a:schemeClr val="accent1"/>
-          </a:effectRef>
-          <a:fontRef idx="minor">
-            <a:schemeClr val="lt1"/>
-          </a:fontRef>
-        </p:style>
-        <p:txBody>
-          <a:bodyPr rtlCol="0" anchor="ctr"/>
-          <a:lstStyle/>
-          <a:p>
-            <a:pPr algn="ctr"/>
-            <a:r>
-              <a:rPr lang="en-US" sz="3200" dirty="0" smtClean="0"/>
-              <a:t>Application Code</a:t>
-            </a:r>
-            <a:endParaRPr lang="en-US" sz="3200" dirty="0"/>
-          </a:p>
-        </p:txBody>
-      </p:sp>
-      <p:sp>
-        <p:nvSpPr>
-          <p:cNvPr id="6" name="Rectangle 5"/>
-          <p:cNvSpPr/>
-          <p:nvPr/>
-        </p:nvSpPr>
-        <p:spPr>
-          <a:xfrm>
-            <a:off x="455776" y="4953000"/>
-            <a:ext cx="3811424" cy="1143000"/>
-          </a:xfrm>
-          <a:prstGeom prst="rect">
-            <a:avLst/>
-          </a:prstGeom>
-          <a:solidFill>
-            <a:srgbClr val="775F55"/>
-          </a:solidFill>
-          <a:ln w="25400">
-            <a:solidFill>
-              <a:schemeClr val="bg2">
-                <a:lumMod val="10000"/>
+            <a:ln w="25400">
+              <a:solidFill>
+                <a:schemeClr val="bg2">
+                  <a:lumMod val="10000"/>
+                </a:schemeClr>
+              </a:solidFill>
+            </a:ln>
+          </p:spPr>
+          <p:style>
+            <a:lnRef idx="2">
+              <a:schemeClr val="accent1">
+                <a:shade val="50000"/>
               </a:schemeClr>
-            </a:solidFill>
-          </a:ln>
-        </p:spPr>
-        <p:style>
-          <a:lnRef idx="2">
-            <a:schemeClr val="accent1">
-              <a:shade val="50000"/>
-            </a:schemeClr>
-          </a:lnRef>
-          <a:fillRef idx="1">
-            <a:schemeClr val="accent1"/>
-          </a:fillRef>
-          <a:effectRef idx="0">
-            <a:schemeClr val="accent1"/>
-          </a:effectRef>
-          <a:fontRef idx="minor">
-            <a:schemeClr val="lt1"/>
-          </a:fontRef>
-        </p:style>
-        <p:txBody>
-          <a:bodyPr rtlCol="0" anchor="ctr"/>
-          <a:lstStyle/>
-          <a:p>
-            <a:pPr algn="ctr"/>
-            <a:r>
-              <a:rPr lang="en-US" sz="3200" dirty="0" smtClean="0"/>
-              <a:t>Android OS</a:t>
-            </a:r>
-            <a:endParaRPr lang="en-US" sz="3200" dirty="0"/>
-          </a:p>
-        </p:txBody>
-      </p:sp>
-      <p:sp>
-        <p:nvSpPr>
-          <p:cNvPr id="7" name="Rectangle 6"/>
-          <p:cNvSpPr/>
-          <p:nvPr/>
-        </p:nvSpPr>
-        <p:spPr>
-          <a:xfrm>
-            <a:off x="4724399" y="4953000"/>
-            <a:ext cx="3919671" cy="1143000"/>
-          </a:xfrm>
-          <a:prstGeom prst="rect">
-            <a:avLst/>
-          </a:prstGeom>
-          <a:solidFill>
-            <a:srgbClr val="775F55"/>
-          </a:solidFill>
-          <a:ln w="25400">
-            <a:solidFill>
-              <a:schemeClr val="bg2">
-                <a:lumMod val="10000"/>
-              </a:schemeClr>
-            </a:solidFill>
-          </a:ln>
-        </p:spPr>
-        <p:style>
-          <a:lnRef idx="2">
-            <a:schemeClr val="accent1">
-              <a:shade val="50000"/>
-            </a:schemeClr>
-          </a:lnRef>
-          <a:fillRef idx="1">
-            <a:schemeClr val="accent1"/>
-          </a:fillRef>
-          <a:effectRef idx="0">
-            <a:schemeClr val="accent1"/>
-          </a:effectRef>
-          <a:fontRef idx="minor">
-            <a:schemeClr val="lt1"/>
-          </a:fontRef>
-        </p:style>
-        <p:txBody>
-          <a:bodyPr rtlCol="0" anchor="ctr"/>
-          <a:lstStyle/>
-          <a:p>
-            <a:pPr algn="ctr"/>
-            <a:r>
-              <a:rPr lang="en-US" sz="3200" dirty="0" smtClean="0"/>
-              <a:t>SQLite DB</a:t>
-            </a:r>
-            <a:endParaRPr lang="en-US" sz="3200" dirty="0"/>
-          </a:p>
-        </p:txBody>
-      </p:sp>
+            </a:lnRef>
+            <a:fillRef idx="1">
+              <a:schemeClr val="accent1"/>
+            </a:fillRef>
+            <a:effectRef idx="0">
+              <a:schemeClr val="accent1"/>
+            </a:effectRef>
+            <a:fontRef idx="minor">
+              <a:schemeClr val="lt1"/>
+            </a:fontRef>
+          </p:style>
+          <p:txBody>
+            <a:bodyPr rtlCol="0" anchor="ctr"/>
+            <a:lstStyle/>
+            <a:p>
+              <a:pPr algn="ctr"/>
+              <a:r>
+                <a:rPr lang="en-US" sz="3200" dirty="0" smtClean="0"/>
+                <a:t>SQLite DB</a:t>
+              </a:r>
+              <a:endParaRPr lang="en-US" sz="3200" dirty="0"/>
+            </a:p>
+          </p:txBody>
+        </p:sp>
+      </p:grpSp>
     </p:spTree>
     <p:extLst>
       <p:ext uri="{BB962C8B-B14F-4D97-AF65-F5344CB8AC3E}">
@@ -4681,7 +4710,11 @@
             <a:pPr algn="ctr"/>
             <a:r>
               <a:rPr lang="en-US" dirty="0" smtClean="0"/>
-              <a:t>Add/Edit Recipe</a:t>
+              <a:t>Add </a:t>
+            </a:r>
+            <a:r>
+              <a:rPr lang="en-US" dirty="0" smtClean="0"/>
+              <a:t>Recipe</a:t>
             </a:r>
             <a:endParaRPr lang="en-US" dirty="0"/>
           </a:p>
@@ -8467,6 +8500,13 @@
   <p:clrMapOvr>
     <a:masterClrMapping/>
   </p:clrMapOvr>
+  <p:timing>
+    <p:tnLst>
+      <p:par>
+        <p:cTn id="1" dur="indefinite" restart="never" nodeType="tmRoot"/>
+      </p:par>
+    </p:tnLst>
+  </p:timing>
 </p:sld>
 </file>
 

</xml_diff>